<commit_message>
Changed the poster for (re?)submitting.
</commit_message>
<xml_diff>
--- a/demo/Poster_ECE362Boggle.pptx
+++ b/demo/Poster_ECE362Boggle.pptx
@@ -134,6 +134,22 @@
       </a:defRPr>
     </a:lvl9pPr>
   </p:defaultTextStyle>
+  <p:extLst>
+    <p:ext uri="{EFAFB233-063F-42B5-8137-9DF3F51BA10A}">
+      <p15:sldGuideLst xmlns:p15="http://schemas.microsoft.com/office/powerpoint/2012/main">
+        <p15:guide id="1" orient="horz" pos="6912">
+          <p15:clr>
+            <a:srgbClr val="A4A3A4"/>
+          </p15:clr>
+        </p15:guide>
+        <p15:guide id="2" pos="10368">
+          <p15:clr>
+            <a:srgbClr val="A4A3A4"/>
+          </p15:clr>
+        </p15:guide>
+      </p15:sldGuideLst>
+    </p:ext>
+  </p:extLst>
 </p:presentation>
 </file>
 
@@ -3603,20 +3619,12 @@
               <a:t>Luke </a:t>
             </a:r>
             <a:r>
-              <a:rPr lang="en-US" sz="4800" dirty="0" err="1" smtClean="0"/>
-              <a:t>Neuman</a:t>
-            </a:r>
-            <a:r>
               <a:rPr lang="en-US" sz="4800" dirty="0" smtClean="0"/>
-              <a:t>, </a:t>
-            </a:r>
-            <a:r>
-              <a:rPr lang="en-US" sz="4800" dirty="0" err="1" smtClean="0"/>
-              <a:t>Subhav</a:t>
+              <a:t>Neumann, </a:t>
             </a:r>
             <a:r>
               <a:rPr lang="en-US" sz="4800" dirty="0" smtClean="0"/>
-              <a:t> Ramachandran, Brian Rieder</a:t>
+              <a:t>Subhav Ramachandran, Brian Rieder</a:t>
             </a:r>
             <a:endParaRPr lang="en-US" sz="4800" dirty="0"/>
           </a:p>
@@ -3643,8 +3651,8 @@
         </p:blipFill>
         <p:spPr bwMode="auto">
           <a:xfrm>
-            <a:off x="9867900" y="2895600"/>
-            <a:ext cx="13030200" cy="8765381"/>
+            <a:off x="1864997" y="11255244"/>
+            <a:ext cx="11622403" cy="7818360"/>
           </a:xfrm>
           <a:prstGeom prst="rect">
             <a:avLst/>
@@ -3669,8 +3677,8 @@
         </p:nvSpPr>
         <p:spPr>
           <a:xfrm>
-            <a:off x="1714500" y="12877800"/>
-            <a:ext cx="28308300" cy="5493812"/>
+            <a:off x="2167889" y="2535857"/>
+            <a:ext cx="11258550" cy="8032968"/>
           </a:xfrm>
           <a:prstGeom prst="rect">
             <a:avLst/>
@@ -3685,33 +3693,48 @@
           <a:p>
             <a:pPr algn="l"/>
             <a:r>
-              <a:rPr lang="en-US" sz="5400" dirty="0" smtClean="0">
+              <a:rPr lang="en-US" sz="5400" u="sng" dirty="0" smtClean="0">
                 <a:latin typeface="Rockwell" panose="02060603020205020403" pitchFamily="18" charset="0"/>
               </a:rPr>
-              <a:t>Objective:</a:t>
-            </a:r>
+              <a:t>Objective</a:t>
+            </a:r>
+            <a:endParaRPr lang="en-US" sz="5400" u="sng" dirty="0" smtClean="0">
+              <a:latin typeface="Rockwell" panose="02060603020205020403" pitchFamily="18" charset="0"/>
+            </a:endParaRPr>
           </a:p>
           <a:p>
             <a:pPr algn="l"/>
             <a:r>
-              <a:rPr lang="en-US" sz="5400" dirty="0" smtClean="0">
+              <a:rPr lang="en-US" sz="4400" dirty="0" smtClean="0">
                 <a:latin typeface="Rockwell" panose="02060603020205020403" pitchFamily="18" charset="0"/>
               </a:rPr>
               <a:t>Implement the word game </a:t>
             </a:r>
             <a:r>
-              <a:rPr lang="en-US" sz="5400" i="1" dirty="0" smtClean="0">
+              <a:rPr lang="en-US" sz="4400" i="1" dirty="0" smtClean="0">
                 <a:latin typeface="Rockwell" panose="02060603020205020403" pitchFamily="18" charset="0"/>
               </a:rPr>
               <a:t>Boggle</a:t>
             </a:r>
             <a:r>
-              <a:rPr lang="en-US" sz="5400" dirty="0" smtClean="0">
+              <a:rPr lang="en-US" sz="4400" dirty="0" smtClean="0">
                 <a:latin typeface="Rockwell" panose="02060603020205020403" pitchFamily="18" charset="0"/>
               </a:rPr>
-              <a:t> by utilizing the MC9S12C32 microcontroller. Users are able to interface with the microcontroller to play the game through the use of a wonderfully “retro” PS/2 keyboard and the words that are found in the randomly generated or user-defined grid are checked for validity and previous usage.</a:t>
-            </a:r>
-            <a:endParaRPr lang="en-US" sz="5400" dirty="0">
+              <a:t> by utilizing the MC9S12C32 microcontroller. Users are able to interface with the microcontroller to play the game through the use of a wonderfully “retro” PS/2 </a:t>
+            </a:r>
+            <a:r>
+              <a:rPr lang="en-US" sz="4400" dirty="0" smtClean="0">
+                <a:latin typeface="Rockwell" panose="02060603020205020403" pitchFamily="18" charset="0"/>
+              </a:rPr>
+              <a:t>keyboard. Words entered are validated agains</a:t>
+            </a:r>
+            <a:r>
+              <a:rPr lang="en-US" sz="4400" dirty="0" smtClean="0">
+                <a:latin typeface="Rockwell" panose="02060603020205020403" pitchFamily="18" charset="0"/>
+              </a:rPr>
+              <a:t>t the randomly generated character grid and a dictionary stored in external flash memory.</a:t>
+            </a:r>
+            <a:endParaRPr lang="en-US" sz="4400" dirty="0">
               <a:latin typeface="Rockwell" panose="02060603020205020403" pitchFamily="18" charset="0"/>
             </a:endParaRPr>
           </a:p>
@@ -3725,8 +3748,8 @@
         </p:nvSpPr>
         <p:spPr>
           <a:xfrm>
-            <a:off x="1066800" y="2895600"/>
-            <a:ext cx="7543800" cy="9156353"/>
+            <a:off x="23768631" y="2535857"/>
+            <a:ext cx="7543800" cy="10602903"/>
           </a:xfrm>
           <a:prstGeom prst="rect">
             <a:avLst/>
@@ -3739,76 +3762,211 @@
           </a:bodyPr>
           <a:lstStyle/>
           <a:p>
-            <a:r>
-              <a:rPr lang="en-US" dirty="0" smtClean="0">
+            <a:pPr algn="l"/>
+            <a:r>
+              <a:rPr lang="en-US" sz="5400" u="sng" dirty="0" smtClean="0">
                 <a:latin typeface="Rockwell" panose="02060603020205020403" pitchFamily="18" charset="0"/>
               </a:rPr>
-              <a:t>Components used:</a:t>
-            </a:r>
-          </a:p>
-          <a:p>
-            <a:r>
-              <a:rPr lang="en-US" dirty="0" smtClean="0">
+              <a:t>Components</a:t>
+            </a:r>
+            <a:endParaRPr lang="en-US" sz="5400" u="sng" dirty="0" smtClean="0">
+              <a:latin typeface="Rockwell" panose="02060603020205020403" pitchFamily="18" charset="0"/>
+            </a:endParaRPr>
+          </a:p>
+          <a:p>
+            <a:pPr marL="571500" indent="-571500" algn="l">
+              <a:spcBef>
+                <a:spcPts val="0"/>
+              </a:spcBef>
+              <a:buFont typeface="Arial" panose="020B0604020202020204" pitchFamily="34" charset="0"/>
+              <a:buChar char="•"/>
+            </a:pPr>
+            <a:r>
+              <a:rPr lang="en-US" sz="4400" dirty="0" smtClean="0">
                 <a:latin typeface="Rockwell" panose="02060603020205020403" pitchFamily="18" charset="0"/>
               </a:rPr>
-              <a:t>1x 20x4 LCD Display</a:t>
-            </a:r>
-          </a:p>
-          <a:p>
-            <a:r>
-              <a:rPr lang="en-US" dirty="0" smtClean="0">
+              <a:t>MC9S12C32 micro and docking </a:t>
+            </a:r>
+            <a:r>
+              <a:rPr lang="en-US" sz="4400" dirty="0">
                 <a:latin typeface="Rockwell" panose="02060603020205020403" pitchFamily="18" charset="0"/>
               </a:rPr>
-              <a:t>2X 20x2 LCD Display</a:t>
-            </a:r>
-          </a:p>
-          <a:p>
-            <a:r>
-              <a:rPr lang="en-US" dirty="0" smtClean="0">
+              <a:t>b</a:t>
+            </a:r>
+            <a:r>
+              <a:rPr lang="en-US" sz="4400" dirty="0" smtClean="0">
+                <a:latin typeface="Rockwell" panose="02060603020205020403" pitchFamily="18" charset="0"/>
+              </a:rPr>
+              <a:t>oard</a:t>
+            </a:r>
+          </a:p>
+          <a:p>
+            <a:pPr marL="571500" indent="-571500" algn="l">
+              <a:spcBef>
+                <a:spcPts val="0"/>
+              </a:spcBef>
+              <a:buFont typeface="Arial" panose="020B0604020202020204" pitchFamily="34" charset="0"/>
+              <a:buChar char="•"/>
+            </a:pPr>
+            <a:r>
+              <a:rPr lang="en-US" sz="4400" dirty="0" smtClean="0">
+                <a:latin typeface="Rockwell" panose="02060603020205020403" pitchFamily="18" charset="0"/>
+              </a:rPr>
+              <a:t>1x </a:t>
+            </a:r>
+            <a:r>
+              <a:rPr lang="en-US" sz="4400" dirty="0" smtClean="0">
+                <a:latin typeface="Rockwell" panose="02060603020205020403" pitchFamily="18" charset="0"/>
+              </a:rPr>
+              <a:t>20x4 LCD Display</a:t>
+            </a:r>
+          </a:p>
+          <a:p>
+            <a:pPr marL="571500" indent="-571500" algn="l">
+              <a:spcBef>
+                <a:spcPts val="0"/>
+              </a:spcBef>
+              <a:buFont typeface="Arial" panose="020B0604020202020204" pitchFamily="34" charset="0"/>
+              <a:buChar char="•"/>
+            </a:pPr>
+            <a:r>
+              <a:rPr lang="en-US" sz="4400" dirty="0" smtClean="0">
+                <a:latin typeface="Rockwell" panose="02060603020205020403" pitchFamily="18" charset="0"/>
+              </a:rPr>
+              <a:t>2X </a:t>
+            </a:r>
+            <a:r>
+              <a:rPr lang="en-US" sz="4400" dirty="0" smtClean="0">
+                <a:latin typeface="Rockwell" panose="02060603020205020403" pitchFamily="18" charset="0"/>
+              </a:rPr>
+              <a:t>16</a:t>
+            </a:r>
+            <a:r>
+              <a:rPr lang="en-US" sz="4400" dirty="0" smtClean="0">
+                <a:latin typeface="Rockwell" panose="02060603020205020403" pitchFamily="18" charset="0"/>
+              </a:rPr>
+              <a:t>x2 </a:t>
+            </a:r>
+            <a:r>
+              <a:rPr lang="en-US" sz="4400" dirty="0" smtClean="0">
+                <a:latin typeface="Rockwell" panose="02060603020205020403" pitchFamily="18" charset="0"/>
+              </a:rPr>
+              <a:t>LCD Display</a:t>
+            </a:r>
+          </a:p>
+          <a:p>
+            <a:pPr marL="571500" indent="-571500" algn="l">
+              <a:spcBef>
+                <a:spcPts val="0"/>
+              </a:spcBef>
+              <a:buFont typeface="Arial" panose="020B0604020202020204" pitchFamily="34" charset="0"/>
+              <a:buChar char="•"/>
+            </a:pPr>
+            <a:r>
+              <a:rPr lang="en-US" sz="4400" dirty="0" smtClean="0">
                 <a:latin typeface="Rockwell" panose="02060603020205020403" pitchFamily="18" charset="0"/>
               </a:rPr>
               <a:t>2x PS/2 Wired Connector</a:t>
             </a:r>
           </a:p>
           <a:p>
-            <a:r>
-              <a:rPr lang="en-US" dirty="0" smtClean="0">
+            <a:pPr marL="571500" indent="-571500" algn="l">
+              <a:spcBef>
+                <a:spcPts val="0"/>
+              </a:spcBef>
+              <a:buFont typeface="Arial" panose="020B0604020202020204" pitchFamily="34" charset="0"/>
+              <a:buChar char="•"/>
+            </a:pPr>
+            <a:r>
+              <a:rPr lang="en-US" sz="4400" dirty="0" smtClean="0">
                 <a:latin typeface="Rockwell" panose="02060603020205020403" pitchFamily="18" charset="0"/>
               </a:rPr>
               <a:t>2x PS/2 Keyboards</a:t>
             </a:r>
           </a:p>
           <a:p>
-            <a:r>
-              <a:rPr lang="en-US" dirty="0" smtClean="0">
+            <a:pPr marL="571500" indent="-571500" algn="l">
+              <a:spcBef>
+                <a:spcPts val="0"/>
+              </a:spcBef>
+              <a:buFont typeface="Arial" panose="020B0604020202020204" pitchFamily="34" charset="0"/>
+              <a:buChar char="•"/>
+            </a:pPr>
+            <a:r>
+              <a:rPr lang="en-US" sz="4400" dirty="0" smtClean="0">
                 <a:latin typeface="Rockwell" panose="02060603020205020403" pitchFamily="18" charset="0"/>
               </a:rPr>
               <a:t>1x 74HC74 Flip-flop</a:t>
             </a:r>
           </a:p>
           <a:p>
-            <a:r>
-              <a:rPr lang="en-US" dirty="0" smtClean="0">
+            <a:pPr marL="571500" indent="-571500" algn="l">
+              <a:spcBef>
+                <a:spcPts val="0"/>
+              </a:spcBef>
+              <a:buFont typeface="Arial" panose="020B0604020202020204" pitchFamily="34" charset="0"/>
+              <a:buChar char="•"/>
+            </a:pPr>
+            <a:r>
+              <a:rPr lang="en-US" sz="4400" dirty="0" smtClean="0">
                 <a:latin typeface="Rockwell" panose="02060603020205020403" pitchFamily="18" charset="0"/>
               </a:rPr>
               <a:t>1x 74HC04 Inverter</a:t>
             </a:r>
           </a:p>
           <a:p>
-            <a:r>
-              <a:rPr lang="en-US" dirty="0" smtClean="0">
+            <a:pPr marL="571500" indent="-571500" algn="l">
+              <a:spcBef>
+                <a:spcPts val="0"/>
+              </a:spcBef>
+              <a:buFont typeface="Arial" panose="020B0604020202020204" pitchFamily="34" charset="0"/>
+              <a:buChar char="•"/>
+            </a:pPr>
+            <a:r>
+              <a:rPr lang="en-US" sz="4400" dirty="0" smtClean="0">
                 <a:latin typeface="Rockwell" panose="02060603020205020403" pitchFamily="18" charset="0"/>
               </a:rPr>
               <a:t>1x W25Q80BV Mb SPI Flash</a:t>
             </a:r>
           </a:p>
           <a:p>
-            <a:r>
-              <a:rPr lang="en-US" dirty="0" smtClean="0">
+            <a:pPr marL="571500" indent="-571500" algn="l">
+              <a:spcBef>
+                <a:spcPts val="0"/>
+              </a:spcBef>
+              <a:buFont typeface="Arial" panose="020B0604020202020204" pitchFamily="34" charset="0"/>
+              <a:buChar char="•"/>
+            </a:pPr>
+            <a:r>
+              <a:rPr lang="en-US" sz="4400" dirty="0" smtClean="0">
                 <a:latin typeface="Rockwell" panose="02060603020205020403" pitchFamily="18" charset="0"/>
               </a:rPr>
-              <a:t>1x 74LVC245 Logic Level Shifter</a:t>
-            </a:r>
+              <a:t>1x 74LVC245 Logic Level </a:t>
+            </a:r>
+            <a:r>
+              <a:rPr lang="en-US" sz="4400" dirty="0" smtClean="0">
+                <a:latin typeface="Rockwell" panose="02060603020205020403" pitchFamily="18" charset="0"/>
+              </a:rPr>
+              <a:t>Shifter</a:t>
+            </a:r>
+          </a:p>
+          <a:p>
+            <a:pPr marL="571500" indent="-571500" algn="l">
+              <a:spcBef>
+                <a:spcPts val="0"/>
+              </a:spcBef>
+              <a:buFont typeface="Arial" panose="020B0604020202020204" pitchFamily="34" charset="0"/>
+              <a:buChar char="•"/>
+            </a:pPr>
+            <a:r>
+              <a:rPr lang="en-US" sz="4400" dirty="0" smtClean="0">
+                <a:latin typeface="Rockwell" panose="02060603020205020403" pitchFamily="18" charset="0"/>
+              </a:rPr>
+              <a:t>3.3 V regulator</a:t>
+            </a:r>
+            <a:endParaRPr lang="en-US" sz="4400" dirty="0" smtClean="0">
+              <a:latin typeface="Rockwell" panose="02060603020205020403" pitchFamily="18" charset="0"/>
+            </a:endParaRPr>
           </a:p>
           <a:p>
             <a:endParaRPr lang="en-US" dirty="0">
@@ -3851,8 +4009,8 @@
         </p:nvSpPr>
         <p:spPr>
           <a:xfrm>
-            <a:off x="24355425" y="2895600"/>
-            <a:ext cx="7543800" cy="11787842"/>
+            <a:off x="13868400" y="2535857"/>
+            <a:ext cx="8719131" cy="14957941"/>
           </a:xfrm>
           <a:prstGeom prst="rect">
             <a:avLst/>
@@ -3866,64 +4024,187 @@
           <a:lstStyle/>
           <a:p>
             <a:r>
-              <a:rPr lang="en-US" dirty="0" smtClean="0">
+              <a:rPr lang="en-US" sz="5400" u="sng" dirty="0" smtClean="0">
                 <a:latin typeface="Rockwell" panose="02060603020205020403" pitchFamily="18" charset="0"/>
               </a:rPr>
-              <a:t>Peripherals used:</a:t>
-            </a:r>
-          </a:p>
-          <a:p>
-            <a:r>
-              <a:rPr lang="en-US" dirty="0" smtClean="0">
+              <a:t>Peripherals and Interfacing</a:t>
+            </a:r>
+            <a:endParaRPr lang="en-US" sz="5400" u="sng" dirty="0" smtClean="0">
+              <a:latin typeface="Rockwell" panose="02060603020205020403" pitchFamily="18" charset="0"/>
+            </a:endParaRPr>
+          </a:p>
+          <a:p>
+            <a:pPr marL="571500" indent="-571500" algn="l">
+              <a:buFont typeface="Arial" panose="020B0604020202020204" pitchFamily="34" charset="0"/>
+              <a:buChar char="•"/>
+            </a:pPr>
+            <a:r>
+              <a:rPr lang="en-US" sz="4400" dirty="0" smtClean="0">
                 <a:latin typeface="Rockwell" panose="02060603020205020403" pitchFamily="18" charset="0"/>
               </a:rPr>
               <a:t>PWM for gradual LCD backlight brightness increase and “time low” flashing</a:t>
             </a:r>
           </a:p>
           <a:p>
-            <a:r>
-              <a:rPr lang="en-US" dirty="0" smtClean="0">
+            <a:pPr marL="571500" indent="-571500" algn="l">
+              <a:buFont typeface="Arial" panose="020B0604020202020204" pitchFamily="34" charset="0"/>
+              <a:buChar char="•"/>
+            </a:pPr>
+            <a:r>
+              <a:rPr lang="en-US" sz="4400" dirty="0" smtClean="0">
                 <a:latin typeface="Rockwell" panose="02060603020205020403" pitchFamily="18" charset="0"/>
               </a:rPr>
               <a:t>SPI for interfacing with W25Q80BV Flash chip.</a:t>
             </a:r>
           </a:p>
           <a:p>
-            <a:r>
-              <a:rPr lang="en-US" dirty="0" smtClean="0">
+            <a:pPr marL="571500" indent="-571500" algn="l">
+              <a:buFont typeface="Arial" panose="020B0604020202020204" pitchFamily="34" charset="0"/>
+              <a:buChar char="•"/>
+            </a:pPr>
+            <a:r>
+              <a:rPr lang="en-US" sz="4400" dirty="0" smtClean="0">
                 <a:latin typeface="Rockwell" panose="02060603020205020403" pitchFamily="18" charset="0"/>
               </a:rPr>
               <a:t>Timer for game countdown and seed randomization for game generation</a:t>
             </a:r>
           </a:p>
           <a:p>
-            <a:r>
-              <a:rPr lang="en-US" dirty="0" smtClean="0">
+            <a:pPr marL="571500" indent="-571500" algn="l">
+              <a:buFont typeface="Arial" panose="020B0604020202020204" pitchFamily="34" charset="0"/>
+              <a:buChar char="•"/>
+            </a:pPr>
+            <a:r>
+              <a:rPr lang="en-US" sz="4400" dirty="0" smtClean="0">
                 <a:latin typeface="Rockwell" panose="02060603020205020403" pitchFamily="18" charset="0"/>
               </a:rPr>
               <a:t>“Bit-banging” was used in order to interface with the keyboard by triggering interrupts through IRQ/XIRQ</a:t>
             </a:r>
           </a:p>
           <a:p>
-            <a:r>
-              <a:rPr lang="en-US" dirty="0" smtClean="0">
+            <a:pPr marL="571500" indent="-571500" algn="l">
+              <a:buFont typeface="Arial" panose="020B0604020202020204" pitchFamily="34" charset="0"/>
+              <a:buChar char="•"/>
+            </a:pPr>
+            <a:r>
+              <a:rPr lang="en-US" sz="4400" dirty="0" smtClean="0">
                 <a:latin typeface="Rockwell" panose="02060603020205020403" pitchFamily="18" charset="0"/>
               </a:rPr>
-              <a:t>Parallel interface with LCD displays sharing data on individual clocks</a:t>
-            </a:r>
-          </a:p>
-          <a:p>
-            <a:endParaRPr lang="en-US" dirty="0">
+              <a:t>Parallel interface with LCD displays sharing data on individual </a:t>
+            </a:r>
+            <a:r>
+              <a:rPr lang="en-US" sz="4400" dirty="0" smtClean="0">
+                <a:latin typeface="Rockwell" panose="02060603020205020403" pitchFamily="18" charset="0"/>
+              </a:rPr>
+              <a:t>clocks</a:t>
+            </a:r>
+            <a:endParaRPr lang="en-US" sz="4400" dirty="0" smtClean="0">
               <a:latin typeface="Rockwell" panose="02060603020205020403" pitchFamily="18" charset="0"/>
             </a:endParaRPr>
           </a:p>
         </p:txBody>
       </p:sp>
+      <p:sp>
+        <p:nvSpPr>
+          <p:cNvPr id="4" name="Rectangle 3"/>
+          <p:cNvSpPr/>
+          <p:nvPr/>
+        </p:nvSpPr>
+        <p:spPr>
+          <a:xfrm>
+            <a:off x="3429000" y="21332250"/>
+            <a:ext cx="7593745" cy="584775"/>
+          </a:xfrm>
+          <a:prstGeom prst="rect">
+            <a:avLst/>
+          </a:prstGeom>
+        </p:spPr>
+        <p:txBody>
+          <a:bodyPr wrap="none">
+            <a:spAutoFit/>
+          </a:bodyPr>
+          <a:lstStyle/>
+          <a:p>
+            <a:r>
+              <a:rPr lang="en-US" sz="3200" dirty="0" smtClean="0">
+                <a:hlinkClick r:id="rId4"/>
+              </a:rPr>
+              <a:t>youtube.com/</a:t>
+            </a:r>
+            <a:r>
+              <a:rPr lang="en-US" sz="3200" dirty="0" err="1" smtClean="0">
+                <a:hlinkClick r:id="rId4"/>
+              </a:rPr>
+              <a:t>watch?v</a:t>
+            </a:r>
+            <a:r>
+              <a:rPr lang="en-US" sz="3200" dirty="0" smtClean="0">
+                <a:hlinkClick r:id="rId4"/>
+              </a:rPr>
+              <a:t>=F9</a:t>
+            </a:r>
+            <a:r>
+              <a:rPr lang="en-US" sz="3200" dirty="0">
+                <a:hlinkClick r:id="rId4"/>
+              </a:rPr>
+              <a:t>_-</a:t>
+            </a:r>
+            <a:r>
+              <a:rPr lang="en-US" sz="3200" dirty="0" smtClean="0">
+                <a:hlinkClick r:id="rId4"/>
+              </a:rPr>
+              <a:t>OybG7bw</a:t>
+            </a:r>
+            <a:r>
+              <a:rPr lang="en-US" sz="3200" dirty="0" smtClean="0"/>
+              <a:t> </a:t>
+            </a:r>
+            <a:endParaRPr lang="en-US" sz="3200" dirty="0"/>
+          </a:p>
+        </p:txBody>
+      </p:sp>
+      <p:pic>
+        <p:nvPicPr>
+          <p:cNvPr id="7" name="Picture 6"/>
+          <p:cNvPicPr>
+            <a:picLocks noChangeAspect="1"/>
+          </p:cNvPicPr>
+          <p:nvPr/>
+        </p:nvPicPr>
+        <p:blipFill>
+          <a:blip r:embed="rId5" cstate="print">
+            <a:extLst>
+              <a:ext uri="{28A0092B-C50C-407E-A947-70E740481C1C}">
+                <a14:useLocalDpi xmlns:a14="http://schemas.microsoft.com/office/drawing/2010/main" val="0"/>
+              </a:ext>
+            </a:extLst>
+          </a:blip>
+          <a:stretch>
+            <a:fillRect/>
+          </a:stretch>
+        </p:blipFill>
+        <p:spPr>
+          <a:xfrm>
+            <a:off x="22587531" y="12582261"/>
+            <a:ext cx="9906000" cy="7429500"/>
+          </a:xfrm>
+          <a:prstGeom prst="rect">
+            <a:avLst/>
+          </a:prstGeom>
+        </p:spPr>
+      </p:pic>
     </p:spTree>
   </p:cSld>
   <p:clrMapOvr>
     <a:masterClrMapping/>
   </p:clrMapOvr>
+  <p:timing>
+    <p:tnLst>
+      <p:par>
+        <p:cTn id="1" dur="indefinite" restart="never" nodeType="tmRoot"/>
+      </p:par>
+    </p:tnLst>
+  </p:timing>
 </p:sld>
 </file>
 

</xml_diff>